<commit_message>
minor update to Frameworks and PA6
</commit_message>
<xml_diff>
--- a/week11/Frameworks.pptx
+++ b/week11/Frameworks.pptx
@@ -32,6 +32,7 @@
     <p:sldId id="276" r:id="rId25"/>
     <p:sldId id="277" r:id="rId26"/>
     <p:sldId id="278" r:id="rId27"/>
+    <p:sldId id="279" r:id="rId28"/>
   </p:sldIdLst>
   <p:sldSz cx="9144000" cy="6858000"/>
   <p:notesSz cx="6858000" cy="9144000"/>
@@ -134,7 +135,7 @@
       </p:grpSpPr>
       <p:sp>
         <p:nvSpPr>
-          <p:cNvPr id="143" name="TextShape 1"/>
+          <p:cNvPr id="146" name="TextShape 1"/>
           <p:cNvSpPr txBox="1"/>
           <p:nvPr/>
         </p:nvSpPr>
@@ -172,7 +173,7 @@
       </p:grpSpPr>
       <p:sp>
         <p:nvSpPr>
-          <p:cNvPr id="148" name="TextShape 1"/>
+          <p:cNvPr id="151" name="TextShape 1"/>
           <p:cNvSpPr txBox="1"/>
           <p:nvPr/>
         </p:nvSpPr>
@@ -210,7 +211,7 @@
       </p:grpSpPr>
       <p:sp>
         <p:nvSpPr>
-          <p:cNvPr id="149" name="TextShape 1"/>
+          <p:cNvPr id="152" name="TextShape 1"/>
           <p:cNvSpPr txBox="1"/>
           <p:nvPr/>
         </p:nvSpPr>
@@ -248,7 +249,7 @@
       </p:grpSpPr>
       <p:sp>
         <p:nvSpPr>
-          <p:cNvPr id="150" name="TextShape 1"/>
+          <p:cNvPr id="153" name="TextShape 1"/>
           <p:cNvSpPr txBox="1"/>
           <p:nvPr/>
         </p:nvSpPr>
@@ -286,7 +287,7 @@
       </p:grpSpPr>
       <p:sp>
         <p:nvSpPr>
-          <p:cNvPr id="151" name="TextShape 1"/>
+          <p:cNvPr id="154" name="TextShape 1"/>
           <p:cNvSpPr txBox="1"/>
           <p:nvPr/>
         </p:nvSpPr>
@@ -324,7 +325,7 @@
       </p:grpSpPr>
       <p:sp>
         <p:nvSpPr>
-          <p:cNvPr id="152" name="TextShape 1"/>
+          <p:cNvPr id="155" name="TextShape 1"/>
           <p:cNvSpPr txBox="1"/>
           <p:nvPr/>
         </p:nvSpPr>
@@ -362,7 +363,7 @@
       </p:grpSpPr>
       <p:sp>
         <p:nvSpPr>
-          <p:cNvPr id="144" name="TextShape 1"/>
+          <p:cNvPr id="147" name="TextShape 1"/>
           <p:cNvSpPr txBox="1"/>
           <p:nvPr/>
         </p:nvSpPr>
@@ -400,7 +401,7 @@
       </p:grpSpPr>
       <p:sp>
         <p:nvSpPr>
-          <p:cNvPr id="153" name="TextShape 1"/>
+          <p:cNvPr id="156" name="TextShape 1"/>
           <p:cNvSpPr txBox="1"/>
           <p:nvPr/>
         </p:nvSpPr>
@@ -438,7 +439,7 @@
       </p:grpSpPr>
       <p:sp>
         <p:nvSpPr>
-          <p:cNvPr id="154" name="TextShape 1"/>
+          <p:cNvPr id="157" name="TextShape 1"/>
           <p:cNvSpPr txBox="1"/>
           <p:nvPr/>
         </p:nvSpPr>
@@ -476,7 +477,7 @@
       </p:grpSpPr>
       <p:sp>
         <p:nvSpPr>
-          <p:cNvPr id="155" name="TextShape 1"/>
+          <p:cNvPr id="158" name="TextShape 1"/>
           <p:cNvSpPr txBox="1"/>
           <p:nvPr/>
         </p:nvSpPr>
@@ -514,7 +515,7 @@
       </p:grpSpPr>
       <p:sp>
         <p:nvSpPr>
-          <p:cNvPr id="156" name="TextShape 1"/>
+          <p:cNvPr id="159" name="TextShape 1"/>
           <p:cNvSpPr txBox="1"/>
           <p:nvPr/>
         </p:nvSpPr>
@@ -552,7 +553,7 @@
       </p:grpSpPr>
       <p:sp>
         <p:nvSpPr>
-          <p:cNvPr id="145" name="TextShape 1"/>
+          <p:cNvPr id="148" name="TextShape 1"/>
           <p:cNvSpPr txBox="1"/>
           <p:nvPr/>
         </p:nvSpPr>
@@ -590,7 +591,7 @@
       </p:grpSpPr>
       <p:sp>
         <p:nvSpPr>
-          <p:cNvPr id="146" name="TextShape 1"/>
+          <p:cNvPr id="149" name="TextShape 1"/>
           <p:cNvSpPr txBox="1"/>
           <p:nvPr/>
         </p:nvSpPr>
@@ -628,7 +629,7 @@
       </p:grpSpPr>
       <p:sp>
         <p:nvSpPr>
-          <p:cNvPr id="147" name="TextShape 1"/>
+          <p:cNvPr id="150" name="TextShape 1"/>
           <p:cNvSpPr txBox="1"/>
           <p:nvPr/>
         </p:nvSpPr>
@@ -3585,7 +3586,7 @@
                 <a:spcPct val="100000"/>
               </a:lnSpc>
             </a:pPr>
-            <a:fld id="{E1D9DF52-EACD-4AE0-AD2A-C76EC3997FB7}" type="slidenum">
+            <a:fld id="{65148DBC-9585-40E3-A269-2A96703199A0}" type="slidenum">
               <a:rPr lang="en-US" sz="1400">
                 <a:solidFill>
                   <a:srgbClr val="1c1c1c"/>
@@ -4400,7 +4401,7 @@
               <a:rPr lang="en-US" sz="2400">
                 <a:latin typeface="Arial"/>
               </a:rPr>
-              <a:t>Use port 5050 (port &gt; 1024 is suggested for Linux and MacOS).</a:t>
+              <a:t>Use port 5555 (port &gt; 1024 is suggested for Linux and MacOS).</a:t>
             </a:r>
             <a:endParaRPr/>
           </a:p>
@@ -7686,6 +7687,34 @@
           </a:p>
         </p:txBody>
       </p:sp>
+      <p:sp>
+        <p:nvSpPr>
+          <p:cNvPr id="141" name="TextShape 3"/>
+          <p:cNvSpPr txBox="1"/>
+          <p:nvPr/>
+        </p:nvSpPr>
+        <p:spPr>
+          <a:xfrm>
+            <a:off x="-2730600" y="217800"/>
+            <a:ext cx="4624560" cy="517320"/>
+          </a:xfrm>
+          <a:prstGeom prst="rect">
+            <a:avLst/>
+          </a:prstGeom>
+        </p:spPr>
+        <p:txBody>
+          <a:bodyPr lIns="90000" rIns="90000" tIns="45000" bIns="45000"/>
+          <a:p>
+            <a:r>
+              <a:rPr lang="en-US" sz="2800">
+                <a:latin typeface="Arial"/>
+              </a:rPr>
+              <a:t>lock = new ReentrantLock();</a:t>
+            </a:r>
+            <a:endParaRPr/>
+          </a:p>
+        </p:txBody>
+      </p:sp>
     </p:spTree>
   </p:cSld>
   <p:timing>
@@ -7744,7 +7773,7 @@
       </p:grpSpPr>
       <p:sp>
         <p:nvSpPr>
-          <p:cNvPr id="141" name="TextShape 1"/>
+          <p:cNvPr id="142" name="TextShape 1"/>
           <p:cNvSpPr txBox="1"/>
           <p:nvPr/>
         </p:nvSpPr>
@@ -7788,7 +7817,7 @@
       </p:sp>
       <p:sp>
         <p:nvSpPr>
-          <p:cNvPr id="142" name="TextShape 2"/>
+          <p:cNvPr id="143" name="TextShape 2"/>
           <p:cNvSpPr txBox="1"/>
           <p:nvPr/>
         </p:nvSpPr>
@@ -7974,6 +8003,154 @@
       </p:par>
     </p:tnLst>
   </p:timing>
+</p:sld>
+</file>
+
+<file path=ppt/slides/slide24.xml><?xml version="1.0" encoding="utf-8"?>
+<p:sld xmlns:a="http://schemas.openxmlformats.org/drawingml/2006/main" xmlns:p="http://schemas.openxmlformats.org/presentationml/2006/main" xmlns:r="http://schemas.openxmlformats.org/officeDocument/2006/relationships">
+  <p:cSld>
+    <p:spTree>
+      <p:nvGrpSpPr>
+        <p:cNvPr id="1" name=""/>
+        <p:cNvGrpSpPr/>
+        <p:nvPr/>
+      </p:nvGrpSpPr>
+      <p:grpSpPr>
+        <a:xfrm>
+          <a:off x="0" y="0"/>
+          <a:ext cx="0" cy="0"/>
+          <a:chOff x="0" y="0"/>
+          <a:chExt cx="0" cy="0"/>
+        </a:xfrm>
+      </p:grpSpPr>
+      <p:sp>
+        <p:nvSpPr>
+          <p:cNvPr id="144" name="TextShape 1"/>
+          <p:cNvSpPr txBox="1"/>
+          <p:nvPr/>
+        </p:nvSpPr>
+        <p:spPr>
+          <a:xfrm>
+            <a:off x="583920" y="142200"/>
+            <a:ext cx="7920000" cy="863640"/>
+          </a:xfrm>
+          <a:prstGeom prst="rect">
+            <a:avLst/>
+          </a:prstGeom>
+        </p:spPr>
+        <p:txBody>
+          <a:bodyPr lIns="90000" rIns="90000" tIns="46800" bIns="46800" anchor="b"/>
+          <a:p>
+            <a:pPr algn="ctr"/>
+            <a:r>
+              <a:rPr lang="en-US" sz="3600">
+                <a:latin typeface="Arial"/>
+              </a:rPr>
+              <a:t>References</a:t>
+            </a:r>
+            <a:endParaRPr/>
+          </a:p>
+        </p:txBody>
+      </p:sp>
+      <p:sp>
+        <p:nvSpPr>
+          <p:cNvPr id="145" name="TextShape 2"/>
+          <p:cNvSpPr txBox="1"/>
+          <p:nvPr/>
+        </p:nvSpPr>
+        <p:spPr>
+          <a:xfrm>
+            <a:off x="674640" y="1400040"/>
+            <a:ext cx="7920000" cy="5275080"/>
+          </a:xfrm>
+          <a:prstGeom prst="rect">
+            <a:avLst/>
+          </a:prstGeom>
+        </p:spPr>
+        <p:txBody>
+          <a:bodyPr lIns="90000" rIns="90000" tIns="46800" bIns="46800"/>
+          <a:p>
+            <a:pPr/>
+            <a:r>
+              <a:rPr lang="en-US" sz="2400">
+                <a:latin typeface="Arial"/>
+              </a:rPr>
+              <a:t>Object Client-Server Framework</a:t>
+            </a:r>
+            <a:endParaRPr/>
+          </a:p>
+          <a:p>
+            <a:pPr lvl="1"/>
+            <a:r>
+              <a:rPr lang="en-US" sz="2000">
+                <a:latin typeface="Arial"/>
+              </a:rPr>
+              <a:t>http://www.site.uottawa.ca/school/research/lloseng/supportMaterial/ocsf/ocsf.html (OCSF is in chapter 3 and chapter 6)</a:t>
+            </a:r>
+            <a:endParaRPr/>
+          </a:p>
+          <a:p>
+            <a:pPr lvl="1"/>
+            <a:r>
+              <a:rPr lang="en-US" sz="2000">
+                <a:latin typeface="Arial"/>
+              </a:rPr>
+              <a:t>Youtube lecture by one of the authors of OCSF:</a:t>
+            </a:r>
+            <a:endParaRPr/>
+          </a:p>
+          <a:p>
+            <a:pPr lvl="1"/>
+            <a:r>
+              <a:rPr lang="en-US" sz="2000">
+                <a:latin typeface="Arial"/>
+              </a:rPr>
+              <a:t>https://www.youtube.com/watch?v=hGM1eT8EVuI</a:t>
+            </a:r>
+            <a:endParaRPr/>
+          </a:p>
+          <a:p>
+            <a:pPr lvl="1"/>
+            <a:endParaRPr/>
+          </a:p>
+          <a:p>
+            <a:pPr/>
+            <a:r>
+              <a:rPr lang="en-US" sz="2000">
+                <a:latin typeface="Arial"/>
+              </a:rPr>
+              <a:t>XMPP - another messaging framework with many applications.</a:t>
+            </a:r>
+            <a:endParaRPr/>
+          </a:p>
+          <a:p>
+            <a:pPr lvl="1"/>
+            <a:r>
+              <a:rPr lang="en-US" sz="2000">
+                <a:latin typeface="Arial"/>
+              </a:rPr>
+              <a:t>https://xmpp.org/</a:t>
+            </a:r>
+            <a:endParaRPr/>
+          </a:p>
+          <a:p>
+            <a:pPr lvl="1"/>
+            <a:r>
+              <a:rPr lang="en-US" sz="2000">
+                <a:latin typeface="Arial"/>
+              </a:rPr>
+              <a:t>Smack - Java XMPP client library</a:t>
+            </a:r>
+            <a:endParaRPr/>
+          </a:p>
+          <a:p>
+            <a:pPr lvl="1"/>
+            <a:endParaRPr/>
+          </a:p>
+        </p:txBody>
+      </p:sp>
+    </p:spTree>
+  </p:cSld>
 </p:sld>
 </file>
 

</xml_diff>